<commit_message>
Fixed a fatal bug
</commit_message>
<xml_diff>
--- a/Presentation.pptx
+++ b/Presentation.pptx
@@ -7,7 +7,8 @@
   <p:sldIdLst>
     <p:sldId id="256" r:id="rId2"/>
     <p:sldId id="257" r:id="rId3"/>
-    <p:sldId id="258" r:id="rId4"/>
+    <p:sldId id="259" r:id="rId4"/>
+    <p:sldId id="258" r:id="rId5"/>
   </p:sldIdLst>
   <p:sldSz cx="12192000" cy="6858000"/>
   <p:notesSz cx="6858000" cy="9144000"/>
@@ -117,7 +118,7 @@
 <file path=ppt/revisionInfo.xml><?xml version="1.0" encoding="utf-8"?>
 <p1510:revInfo xmlns:a="http://schemas.openxmlformats.org/drawingml/2006/main" xmlns:r="http://schemas.openxmlformats.org/officeDocument/2006/relationships" xmlns:p1510="http://schemas.microsoft.com/office/powerpoint/2015/10/main">
   <p1510:revLst>
-    <p1510:client id="{EB6988B6-194F-4AA2-926F-410AC0A7BA8B}" v="3" dt="2020-10-30T00:52:55.154"/>
+    <p1510:client id="{6B06DE07-4A29-42C0-949A-E440D8917D93}" v="1" dt="2020-10-31T19:53:31.395"/>
   </p1510:revLst>
 </p1510:revInfo>
 </file>
@@ -126,47 +127,150 @@
 <pc:chgInfo xmlns:a="http://schemas.openxmlformats.org/drawingml/2006/main" xmlns:r="http://schemas.openxmlformats.org/officeDocument/2006/relationships" xmlns:ac="http://schemas.microsoft.com/office/drawing/2013/main/command" xmlns:pc="http://schemas.microsoft.com/office/powerpoint/2013/main/command">
   <pc:docChgLst>
     <pc:chgData name="Max Curie" userId="fd60193ee69b7ad5" providerId="LiveId" clId="{6B06DE07-4A29-42C0-949A-E440D8917D93}"/>
-    <pc:docChg chg="addSld modSld">
-      <pc:chgData name="Max Curie" userId="fd60193ee69b7ad5" providerId="LiveId" clId="{6B06DE07-4A29-42C0-949A-E440D8917D93}" dt="2020-10-25T21:34:19.464" v="37" actId="20577"/>
+    <pc:docChg chg="undo custSel addSld modSld">
+      <pc:chgData name="Max Curie" userId="fd60193ee69b7ad5" providerId="LiveId" clId="{6B06DE07-4A29-42C0-949A-E440D8917D93}" dt="2020-10-31T21:33:50.337" v="528" actId="403"/>
       <pc:docMkLst>
         <pc:docMk/>
       </pc:docMkLst>
-      <pc:sldChg chg="new">
-        <pc:chgData name="Max Curie" userId="fd60193ee69b7ad5" providerId="LiveId" clId="{6B06DE07-4A29-42C0-949A-E440D8917D93}" dt="2020-10-25T21:33:44.398" v="0" actId="680"/>
+      <pc:sldChg chg="modSp new mod">
+        <pc:chgData name="Max Curie" userId="fd60193ee69b7ad5" providerId="LiveId" clId="{6B06DE07-4A29-42C0-949A-E440D8917D93}" dt="2020-10-31T21:33:50.337" v="528" actId="403"/>
         <pc:sldMkLst>
           <pc:docMk/>
           <pc:sldMk cId="888562028" sldId="256"/>
         </pc:sldMkLst>
+        <pc:spChg chg="mod">
+          <ac:chgData name="Max Curie" userId="fd60193ee69b7ad5" providerId="LiveId" clId="{6B06DE07-4A29-42C0-949A-E440D8917D93}" dt="2020-10-31T21:33:45.050" v="527" actId="313"/>
+          <ac:spMkLst>
+            <pc:docMk/>
+            <pc:sldMk cId="888562028" sldId="256"/>
+            <ac:spMk id="2" creationId="{EC41EC29-E927-4367-9300-91BC557A8858}"/>
+          </ac:spMkLst>
+        </pc:spChg>
+        <pc:spChg chg="mod">
+          <ac:chgData name="Max Curie" userId="fd60193ee69b7ad5" providerId="LiveId" clId="{6B06DE07-4A29-42C0-949A-E440D8917D93}" dt="2020-10-31T21:33:50.337" v="528" actId="403"/>
+          <ac:spMkLst>
+            <pc:docMk/>
+            <pc:sldMk cId="888562028" sldId="256"/>
+            <ac:spMk id="3" creationId="{F935C5CB-F5DB-470D-906F-5754BC111938}"/>
+          </ac:spMkLst>
+        </pc:spChg>
       </pc:sldChg>
-      <pc:sldChg chg="addSp modSp new mod">
-        <pc:chgData name="Max Curie" userId="fd60193ee69b7ad5" providerId="LiveId" clId="{6B06DE07-4A29-42C0-949A-E440D8917D93}" dt="2020-10-25T21:34:19.464" v="37" actId="20577"/>
+      <pc:sldChg chg="addSp delSp modSp new mod">
+        <pc:chgData name="Max Curie" userId="fd60193ee69b7ad5" providerId="LiveId" clId="{6B06DE07-4A29-42C0-949A-E440D8917D93}" dt="2020-10-31T21:14:39.551" v="76" actId="1076"/>
         <pc:sldMkLst>
           <pc:docMk/>
           <pc:sldMk cId="2403394870" sldId="257"/>
         </pc:sldMkLst>
-        <pc:spChg chg="mod">
-          <ac:chgData name="Max Curie" userId="fd60193ee69b7ad5" providerId="LiveId" clId="{6B06DE07-4A29-42C0-949A-E440D8917D93}" dt="2020-10-25T21:34:19.464" v="37" actId="20577"/>
+        <pc:spChg chg="del mod">
+          <ac:chgData name="Max Curie" userId="fd60193ee69b7ad5" providerId="LiveId" clId="{6B06DE07-4A29-42C0-949A-E440D8917D93}" dt="2020-10-31T21:13:14.033" v="54" actId="478"/>
           <ac:spMkLst>
             <pc:docMk/>
             <pc:sldMk cId="2403394870" sldId="257"/>
             <ac:spMk id="2" creationId="{5B4814EE-E8A3-4207-9BA9-E5E82ECC5482}"/>
           </ac:spMkLst>
         </pc:spChg>
+        <pc:spChg chg="del">
+          <ac:chgData name="Max Curie" userId="fd60193ee69b7ad5" providerId="LiveId" clId="{6B06DE07-4A29-42C0-949A-E440D8917D93}" dt="2020-10-31T19:53:31.395" v="38"/>
+          <ac:spMkLst>
+            <pc:docMk/>
+            <pc:sldMk cId="2403394870" sldId="257"/>
+            <ac:spMk id="3" creationId="{6BC5132F-EB84-44BF-A363-CF98AB351468}"/>
+          </ac:spMkLst>
+        </pc:spChg>
+        <pc:spChg chg="mod">
+          <ac:chgData name="Max Curie" userId="fd60193ee69b7ad5" providerId="LiveId" clId="{6B06DE07-4A29-42C0-949A-E440D8917D93}" dt="2020-10-31T21:14:39.551" v="76" actId="1076"/>
+          <ac:spMkLst>
+            <pc:docMk/>
+            <pc:sldMk cId="2403394870" sldId="257"/>
+            <ac:spMk id="6" creationId="{E0188E8A-ADB1-416D-93D7-1AA91DD3E193}"/>
+          </ac:spMkLst>
+        </pc:spChg>
+        <pc:spChg chg="add del mod">
+          <ac:chgData name="Max Curie" userId="fd60193ee69b7ad5" providerId="LiveId" clId="{6B06DE07-4A29-42C0-949A-E440D8917D93}" dt="2020-10-31T21:13:50.697" v="55" actId="478"/>
+          <ac:spMkLst>
+            <pc:docMk/>
+            <pc:sldMk cId="2403394870" sldId="257"/>
+            <ac:spMk id="9" creationId="{81AF3CAE-3466-4DD9-9DEC-A80D94894F17}"/>
+          </ac:spMkLst>
+        </pc:spChg>
         <pc:picChg chg="add mod">
-          <ac:chgData name="Max Curie" userId="fd60193ee69b7ad5" providerId="LiveId" clId="{6B06DE07-4A29-42C0-949A-E440D8917D93}" dt="2020-10-25T21:33:54.501" v="9" actId="1076"/>
+          <ac:chgData name="Max Curie" userId="fd60193ee69b7ad5" providerId="LiveId" clId="{6B06DE07-4A29-42C0-949A-E440D8917D93}" dt="2020-10-31T21:14:16.825" v="64" actId="1076"/>
           <ac:picMkLst>
             <pc:docMk/>
             <pc:sldMk cId="2403394870" sldId="257"/>
             <ac:picMk id="5" creationId="{05019D3F-99FA-4410-9AFD-D9F1333BA4CC}"/>
           </ac:picMkLst>
         </pc:picChg>
+        <pc:picChg chg="add mod">
+          <ac:chgData name="Max Curie" userId="fd60193ee69b7ad5" providerId="LiveId" clId="{6B06DE07-4A29-42C0-949A-E440D8917D93}" dt="2020-10-31T21:13:54.865" v="57" actId="1076"/>
+          <ac:picMkLst>
+            <pc:docMk/>
+            <pc:sldMk cId="2403394870" sldId="257"/>
+            <ac:picMk id="7" creationId="{4867F290-288A-43C4-8380-91F64EE84C10}"/>
+          </ac:picMkLst>
+        </pc:picChg>
+        <pc:picChg chg="add mod">
+          <ac:chgData name="Max Curie" userId="fd60193ee69b7ad5" providerId="LiveId" clId="{6B06DE07-4A29-42C0-949A-E440D8917D93}" dt="2020-10-31T21:14:18.020" v="65" actId="1076"/>
+          <ac:picMkLst>
+            <pc:docMk/>
+            <pc:sldMk cId="2403394870" sldId="257"/>
+            <ac:picMk id="11" creationId="{CA003085-B935-4E71-B233-EC376DA61A24}"/>
+          </ac:picMkLst>
+        </pc:picChg>
+        <pc:picChg chg="add del mod">
+          <ac:chgData name="Max Curie" userId="fd60193ee69b7ad5" providerId="LiveId" clId="{6B06DE07-4A29-42C0-949A-E440D8917D93}" dt="2020-10-31T21:14:27.440" v="71" actId="21"/>
+          <ac:picMkLst>
+            <pc:docMk/>
+            <pc:sldMk cId="2403394870" sldId="257"/>
+            <ac:picMk id="13" creationId="{DB4C0231-C970-4948-8668-CFCEA06B5414}"/>
+          </ac:picMkLst>
+        </pc:picChg>
       </pc:sldChg>
-      <pc:sldChg chg="new">
-        <pc:chgData name="Max Curie" userId="fd60193ee69b7ad5" providerId="LiveId" clId="{6B06DE07-4A29-42C0-949A-E440D8917D93}" dt="2020-10-25T21:33:45.080" v="2" actId="680"/>
+      <pc:sldChg chg="addSp delSp modSp new mod">
+        <pc:chgData name="Max Curie" userId="fd60193ee69b7ad5" providerId="LiveId" clId="{6B06DE07-4A29-42C0-949A-E440D8917D93}" dt="2020-10-31T21:14:31.480" v="74" actId="1076"/>
         <pc:sldMkLst>
           <pc:docMk/>
           <pc:sldMk cId="1983507165" sldId="258"/>
         </pc:sldMkLst>
+        <pc:picChg chg="del">
+          <ac:chgData name="Max Curie" userId="fd60193ee69b7ad5" providerId="LiveId" clId="{6B06DE07-4A29-42C0-949A-E440D8917D93}" dt="2020-10-31T21:14:21.227" v="66" actId="21"/>
+          <ac:picMkLst>
+            <pc:docMk/>
+            <pc:sldMk cId="1983507165" sldId="258"/>
+            <ac:picMk id="4" creationId="{5B443723-780F-4673-91DB-FAD9402AC875}"/>
+          </ac:picMkLst>
+        </pc:picChg>
+        <pc:picChg chg="add mod">
+          <ac:chgData name="Max Curie" userId="fd60193ee69b7ad5" providerId="LiveId" clId="{6B06DE07-4A29-42C0-949A-E440D8917D93}" dt="2020-10-31T21:14:31.480" v="74" actId="1076"/>
+          <ac:picMkLst>
+            <pc:docMk/>
+            <pc:sldMk cId="1983507165" sldId="258"/>
+            <ac:picMk id="6" creationId="{C750C2FA-F736-4E85-B6FA-9BCB3622BC12}"/>
+          </ac:picMkLst>
+        </pc:picChg>
+      </pc:sldChg>
+      <pc:sldChg chg="modSp new mod">
+        <pc:chgData name="Max Curie" userId="fd60193ee69b7ad5" providerId="LiveId" clId="{6B06DE07-4A29-42C0-949A-E440D8917D93}" dt="2020-10-31T21:18:12.709" v="489" actId="20577"/>
+        <pc:sldMkLst>
+          <pc:docMk/>
+          <pc:sldMk cId="2454877801" sldId="259"/>
+        </pc:sldMkLst>
+        <pc:spChg chg="mod">
+          <ac:chgData name="Max Curie" userId="fd60193ee69b7ad5" providerId="LiveId" clId="{6B06DE07-4A29-42C0-949A-E440D8917D93}" dt="2020-10-31T21:14:55.910" v="129" actId="20577"/>
+          <ac:spMkLst>
+            <pc:docMk/>
+            <pc:sldMk cId="2454877801" sldId="259"/>
+            <ac:spMk id="2" creationId="{325D6BA6-4270-4C69-8151-F0A824767CA7}"/>
+          </ac:spMkLst>
+        </pc:spChg>
+        <pc:spChg chg="mod">
+          <ac:chgData name="Max Curie" userId="fd60193ee69b7ad5" providerId="LiveId" clId="{6B06DE07-4A29-42C0-949A-E440D8917D93}" dt="2020-10-31T21:18:12.709" v="489" actId="20577"/>
+          <ac:spMkLst>
+            <pc:docMk/>
+            <pc:sldMk cId="2454877801" sldId="259"/>
+            <ac:spMk id="3" creationId="{3CACE87B-0CC4-4522-AB95-9FA405E584DB}"/>
+          </ac:spMkLst>
+        </pc:spChg>
       </pc:sldChg>
     </pc:docChg>
   </pc:docChgLst>
@@ -391,7 +495,7 @@
           <a:p>
             <a:fld id="{14921191-738D-46C9-972B-356EDD7C1F51}" type="datetimeFigureOut">
               <a:rPr lang="en-US" smtClean="0"/>
-              <a:t>10/29/2020</a:t>
+              <a:t>10/31/2020</a:t>
             </a:fld>
             <a:endParaRPr lang="en-US"/>
           </a:p>
@@ -589,7 +693,7 @@
           <a:p>
             <a:fld id="{14921191-738D-46C9-972B-356EDD7C1F51}" type="datetimeFigureOut">
               <a:rPr lang="en-US" smtClean="0"/>
-              <a:t>10/29/2020</a:t>
+              <a:t>10/31/2020</a:t>
             </a:fld>
             <a:endParaRPr lang="en-US"/>
           </a:p>
@@ -797,7 +901,7 @@
           <a:p>
             <a:fld id="{14921191-738D-46C9-972B-356EDD7C1F51}" type="datetimeFigureOut">
               <a:rPr lang="en-US" smtClean="0"/>
-              <a:t>10/29/2020</a:t>
+              <a:t>10/31/2020</a:t>
             </a:fld>
             <a:endParaRPr lang="en-US"/>
           </a:p>
@@ -995,7 +1099,7 @@
           <a:p>
             <a:fld id="{14921191-738D-46C9-972B-356EDD7C1F51}" type="datetimeFigureOut">
               <a:rPr lang="en-US" smtClean="0"/>
-              <a:t>10/29/2020</a:t>
+              <a:t>10/31/2020</a:t>
             </a:fld>
             <a:endParaRPr lang="en-US"/>
           </a:p>
@@ -1270,7 +1374,7 @@
           <a:p>
             <a:fld id="{14921191-738D-46C9-972B-356EDD7C1F51}" type="datetimeFigureOut">
               <a:rPr lang="en-US" smtClean="0"/>
-              <a:t>10/29/2020</a:t>
+              <a:t>10/31/2020</a:t>
             </a:fld>
             <a:endParaRPr lang="en-US"/>
           </a:p>
@@ -1535,7 +1639,7 @@
           <a:p>
             <a:fld id="{14921191-738D-46C9-972B-356EDD7C1F51}" type="datetimeFigureOut">
               <a:rPr lang="en-US" smtClean="0"/>
-              <a:t>10/29/2020</a:t>
+              <a:t>10/31/2020</a:t>
             </a:fld>
             <a:endParaRPr lang="en-US"/>
           </a:p>
@@ -1947,7 +2051,7 @@
           <a:p>
             <a:fld id="{14921191-738D-46C9-972B-356EDD7C1F51}" type="datetimeFigureOut">
               <a:rPr lang="en-US" smtClean="0"/>
-              <a:t>10/29/2020</a:t>
+              <a:t>10/31/2020</a:t>
             </a:fld>
             <a:endParaRPr lang="en-US"/>
           </a:p>
@@ -2088,7 +2192,7 @@
           <a:p>
             <a:fld id="{14921191-738D-46C9-972B-356EDD7C1F51}" type="datetimeFigureOut">
               <a:rPr lang="en-US" smtClean="0"/>
-              <a:t>10/29/2020</a:t>
+              <a:t>10/31/2020</a:t>
             </a:fld>
             <a:endParaRPr lang="en-US"/>
           </a:p>
@@ -2201,7 +2305,7 @@
           <a:p>
             <a:fld id="{14921191-738D-46C9-972B-356EDD7C1F51}" type="datetimeFigureOut">
               <a:rPr lang="en-US" smtClean="0"/>
-              <a:t>10/29/2020</a:t>
+              <a:t>10/31/2020</a:t>
             </a:fld>
             <a:endParaRPr lang="en-US"/>
           </a:p>
@@ -2512,7 +2616,7 @@
           <a:p>
             <a:fld id="{14921191-738D-46C9-972B-356EDD7C1F51}" type="datetimeFigureOut">
               <a:rPr lang="en-US" smtClean="0"/>
-              <a:t>10/29/2020</a:t>
+              <a:t>10/31/2020</a:t>
             </a:fld>
             <a:endParaRPr lang="en-US"/>
           </a:p>
@@ -2800,7 +2904,7 @@
           <a:p>
             <a:fld id="{14921191-738D-46C9-972B-356EDD7C1F51}" type="datetimeFigureOut">
               <a:rPr lang="en-US" smtClean="0"/>
-              <a:t>10/29/2020</a:t>
+              <a:t>10/31/2020</a:t>
             </a:fld>
             <a:endParaRPr lang="en-US"/>
           </a:p>
@@ -3041,7 +3145,7 @@
           <a:p>
             <a:fld id="{14921191-738D-46C9-972B-356EDD7C1F51}" type="datetimeFigureOut">
               <a:rPr lang="en-US" smtClean="0"/>
-              <a:t>10/29/2020</a:t>
+              <a:t>10/31/2020</a:t>
             </a:fld>
             <a:endParaRPr lang="en-US"/>
           </a:p>
@@ -3474,37 +3578,57 @@
             <p:ph type="ctrTitle"/>
           </p:nvPr>
         </p:nvSpPr>
+        <p:spPr>
+          <a:xfrm>
+            <a:off x="1524000" y="669602"/>
+            <a:ext cx="9144000" cy="2387600"/>
+          </a:xfrm>
+        </p:spPr>
+        <p:txBody>
+          <a:bodyPr/>
+          <a:lstStyle/>
+          <a:p>
+            <a:r>
+              <a:rPr lang="en-US" dirty="0"/>
+              <a:t>Kinetic simulation</a:t>
+            </a:r>
+            <a:br>
+              <a:rPr lang="en-US" dirty="0"/>
+            </a:br>
+            <a:r>
+              <a:rPr lang="en-US" dirty="0"/>
+              <a:t>of disease transmission</a:t>
+            </a:r>
+          </a:p>
+        </p:txBody>
+      </p:sp>
+      <p:sp>
+        <p:nvSpPr>
+          <p:cNvPr id="3" name="Subtitle 2">
+            <a:extLst>
+              <a:ext uri="{FF2B5EF4-FFF2-40B4-BE49-F238E27FC236}">
+                <a16:creationId xmlns:a16="http://schemas.microsoft.com/office/drawing/2014/main" id="{F935C5CB-F5DB-470D-906F-5754BC111938}"/>
+              </a:ext>
+            </a:extLst>
+          </p:cNvPr>
+          <p:cNvSpPr>
+            <a:spLocks noGrp="1"/>
+          </p:cNvSpPr>
+          <p:nvPr>
+            <p:ph type="subTitle" idx="1"/>
+          </p:nvPr>
+        </p:nvSpPr>
         <p:spPr/>
         <p:txBody>
-          <a:bodyPr/>
-          <a:lstStyle/>
-          <a:p>
-            <a:endParaRPr lang="en-US"/>
-          </a:p>
-        </p:txBody>
-      </p:sp>
-      <p:sp>
-        <p:nvSpPr>
-          <p:cNvPr id="3" name="Subtitle 2">
-            <a:extLst>
-              <a:ext uri="{FF2B5EF4-FFF2-40B4-BE49-F238E27FC236}">
-                <a16:creationId xmlns:a16="http://schemas.microsoft.com/office/drawing/2014/main" id="{F935C5CB-F5DB-470D-906F-5754BC111938}"/>
-              </a:ext>
-            </a:extLst>
-          </p:cNvPr>
-          <p:cNvSpPr>
-            <a:spLocks noGrp="1"/>
-          </p:cNvSpPr>
-          <p:nvPr>
-            <p:ph type="subTitle" idx="1"/>
-          </p:nvPr>
-        </p:nvSpPr>
-        <p:spPr/>
-        <p:txBody>
-          <a:bodyPr/>
-          <a:lstStyle/>
-          <a:p>
-            <a:endParaRPr lang="en-US"/>
+          <a:bodyPr>
+            <a:normAutofit/>
+          </a:bodyPr>
+          <a:lstStyle/>
+          <a:p>
+            <a:r>
+              <a:rPr lang="en-US" sz="3600" dirty="0"/>
+              <a:t>Max Curie</a:t>
+            </a:r>
           </a:p>
         </p:txBody>
       </p:sp>
@@ -3538,66 +3662,41 @@
           <a:chExt cx="0" cy="0"/>
         </a:xfrm>
       </p:grpSpPr>
-      <p:sp>
-        <p:nvSpPr>
-          <p:cNvPr id="2" name="Title 1">
-            <a:extLst>
-              <a:ext uri="{FF2B5EF4-FFF2-40B4-BE49-F238E27FC236}">
-                <a16:creationId xmlns:a16="http://schemas.microsoft.com/office/drawing/2014/main" id="{5B4814EE-E8A3-4207-9BA9-E5E82ECC5482}"/>
-              </a:ext>
-            </a:extLst>
-          </p:cNvPr>
-          <p:cNvSpPr>
-            <a:spLocks noGrp="1"/>
-          </p:cNvSpPr>
-          <p:nvPr>
-            <p:ph type="title"/>
-          </p:nvPr>
-        </p:nvSpPr>
+      <p:pic>
+        <p:nvPicPr>
+          <p:cNvPr id="7" name="Content Placeholder 6" descr="Chart, scatter chart&#10;&#10;Description automatically generated">
+            <a:extLst>
+              <a:ext uri="{FF2B5EF4-FFF2-40B4-BE49-F238E27FC236}">
+                <a16:creationId xmlns:a16="http://schemas.microsoft.com/office/drawing/2014/main" id="{4867F290-288A-43C4-8380-91F64EE84C10}"/>
+              </a:ext>
+            </a:extLst>
+          </p:cNvPr>
+          <p:cNvPicPr>
+            <a:picLocks noGrp="1" noChangeAspect="1"/>
+          </p:cNvPicPr>
+          <p:nvPr>
+            <p:ph idx="1"/>
+          </p:nvPr>
+        </p:nvPicPr>
+        <p:blipFill>
+          <a:blip r:embed="rId2">
+            <a:extLst>
+              <a:ext uri="{28A0092B-C50C-407E-A947-70E740481C1C}">
+                <a14:useLocalDpi xmlns:a14="http://schemas.microsoft.com/office/drawing/2010/main" val="0"/>
+              </a:ext>
+            </a:extLst>
+          </a:blip>
+          <a:stretch>
+            <a:fillRect/>
+          </a:stretch>
+        </p:blipFill>
         <p:spPr>
           <a:xfrm>
-            <a:off x="216326" y="77356"/>
-            <a:ext cx="4559860" cy="1193538"/>
+            <a:off x="5993363" y="1135063"/>
+            <a:ext cx="5982311" cy="4486733"/>
           </a:xfrm>
         </p:spPr>
-        <p:txBody>
-          <a:bodyPr>
-            <a:normAutofit fontScale="90000"/>
-          </a:bodyPr>
-          <a:lstStyle/>
-          <a:p>
-            <a:r>
-              <a:rPr lang="en-US" dirty="0"/>
-              <a:t>Non kinetic simulation</a:t>
-            </a:r>
-          </a:p>
-        </p:txBody>
-      </p:sp>
-      <p:sp>
-        <p:nvSpPr>
-          <p:cNvPr id="3" name="Content Placeholder 2">
-            <a:extLst>
-              <a:ext uri="{FF2B5EF4-FFF2-40B4-BE49-F238E27FC236}">
-                <a16:creationId xmlns:a16="http://schemas.microsoft.com/office/drawing/2014/main" id="{6BC5132F-EB84-44BF-A363-CF98AB351468}"/>
-              </a:ext>
-            </a:extLst>
-          </p:cNvPr>
-          <p:cNvSpPr>
-            <a:spLocks noGrp="1"/>
-          </p:cNvSpPr>
-          <p:nvPr>
-            <p:ph idx="1"/>
-          </p:nvPr>
-        </p:nvSpPr>
-        <p:spPr/>
-        <p:txBody>
-          <a:bodyPr/>
-          <a:lstStyle/>
-          <a:p>
-            <a:endParaRPr lang="en-US" dirty="0"/>
-          </a:p>
-        </p:txBody>
-      </p:sp>
+      </p:pic>
       <p:pic>
         <p:nvPicPr>
           <p:cNvPr id="5" name="Picture 4">
@@ -3613,15 +3712,15 @@
           <p:nvPr/>
         </p:nvPicPr>
         <p:blipFill>
-          <a:blip r:embed="rId2"/>
+          <a:blip r:embed="rId3"/>
           <a:stretch>
             <a:fillRect/>
           </a:stretch>
         </p:blipFill>
         <p:spPr>
           <a:xfrm>
-            <a:off x="216326" y="1180730"/>
-            <a:ext cx="4242140" cy="3164889"/>
+            <a:off x="440109" y="11066"/>
+            <a:ext cx="3375960" cy="2518667"/>
           </a:xfrm>
           <a:prstGeom prst="rect">
             <a:avLst/>
@@ -3644,7 +3743,7 @@
         </p:nvSpPr>
         <p:spPr>
           <a:xfrm>
-            <a:off x="7660433" y="77356"/>
+            <a:off x="4677203" y="42666"/>
             <a:ext cx="4559860" cy="1193538"/>
           </a:xfrm>
           <a:prstGeom prst="rect">
@@ -3682,6 +3781,36 @@
           </a:p>
         </p:txBody>
       </p:sp>
+      <p:pic>
+        <p:nvPicPr>
+          <p:cNvPr id="11" name="Picture 10">
+            <a:extLst>
+              <a:ext uri="{FF2B5EF4-FFF2-40B4-BE49-F238E27FC236}">
+                <a16:creationId xmlns:a16="http://schemas.microsoft.com/office/drawing/2014/main" id="{CA003085-B935-4E71-B233-EC376DA61A24}"/>
+              </a:ext>
+            </a:extLst>
+          </p:cNvPr>
+          <p:cNvPicPr>
+            <a:picLocks noChangeAspect="1"/>
+          </p:cNvPicPr>
+          <p:nvPr/>
+        </p:nvPicPr>
+        <p:blipFill>
+          <a:blip r:embed="rId4"/>
+          <a:stretch>
+            <a:fillRect/>
+          </a:stretch>
+        </p:blipFill>
+        <p:spPr>
+          <a:xfrm>
+            <a:off x="216326" y="2669692"/>
+            <a:ext cx="3554075" cy="3713584"/>
+          </a:xfrm>
+          <a:prstGeom prst="rect">
+            <a:avLst/>
+          </a:prstGeom>
+        </p:spPr>
+      </p:pic>
     </p:spTree>
     <p:extLst>
       <p:ext uri="{BB962C8B-B14F-4D97-AF65-F5344CB8AC3E}">
@@ -3717,6 +3846,139 @@
           <p:cNvPr id="2" name="Title 1">
             <a:extLst>
               <a:ext uri="{FF2B5EF4-FFF2-40B4-BE49-F238E27FC236}">
+                <a16:creationId xmlns:a16="http://schemas.microsoft.com/office/drawing/2014/main" id="{325D6BA6-4270-4C69-8151-F0A824767CA7}"/>
+              </a:ext>
+            </a:extLst>
+          </p:cNvPr>
+          <p:cNvSpPr>
+            <a:spLocks noGrp="1"/>
+          </p:cNvSpPr>
+          <p:nvPr>
+            <p:ph type="title"/>
+          </p:nvPr>
+        </p:nvSpPr>
+        <p:spPr/>
+        <p:txBody>
+          <a:bodyPr/>
+          <a:lstStyle/>
+          <a:p>
+            <a:r>
+              <a:rPr lang="en-US" dirty="0"/>
+              <a:t>Work during the Hackathon</a:t>
+            </a:r>
+          </a:p>
+        </p:txBody>
+      </p:sp>
+      <p:sp>
+        <p:nvSpPr>
+          <p:cNvPr id="3" name="Content Placeholder 2">
+            <a:extLst>
+              <a:ext uri="{FF2B5EF4-FFF2-40B4-BE49-F238E27FC236}">
+                <a16:creationId xmlns:a16="http://schemas.microsoft.com/office/drawing/2014/main" id="{3CACE87B-0CC4-4522-AB95-9FA405E584DB}"/>
+              </a:ext>
+            </a:extLst>
+          </p:cNvPr>
+          <p:cNvSpPr>
+            <a:spLocks noGrp="1"/>
+          </p:cNvSpPr>
+          <p:nvPr>
+            <p:ph idx="1"/>
+          </p:nvPr>
+        </p:nvSpPr>
+        <p:spPr/>
+        <p:txBody>
+          <a:bodyPr>
+            <a:normAutofit/>
+          </a:bodyPr>
+          <a:lstStyle/>
+          <a:p>
+            <a:r>
+              <a:rPr lang="en-US" dirty="0"/>
+              <a:t>Analyze data set from CDC for age distribution of the disease </a:t>
+            </a:r>
+          </a:p>
+          <a:p>
+            <a:r>
+              <a:rPr lang="en-US" dirty="0"/>
+              <a:t>Analyze data for indirect impact of COVID</a:t>
+            </a:r>
+          </a:p>
+          <a:p>
+            <a:pPr lvl="1"/>
+            <a:r>
+              <a:rPr lang="en-US" dirty="0"/>
+              <a:t>Traveling(mobility)</a:t>
+            </a:r>
+          </a:p>
+          <a:p>
+            <a:pPr lvl="1"/>
+            <a:r>
+              <a:rPr lang="en-US" dirty="0"/>
+              <a:t>Mental health</a:t>
+            </a:r>
+          </a:p>
+          <a:p>
+            <a:pPr lvl="1"/>
+            <a:r>
+              <a:rPr lang="en-US" dirty="0"/>
+              <a:t>Physical health not related to COVID</a:t>
+            </a:r>
+          </a:p>
+          <a:p>
+            <a:r>
+              <a:rPr lang="en-US" dirty="0"/>
+              <a:t>Propose strategy for future plague </a:t>
+            </a:r>
+          </a:p>
+          <a:p>
+            <a:r>
+              <a:rPr lang="en-US" dirty="0"/>
+              <a:t>And more!</a:t>
+            </a:r>
+          </a:p>
+          <a:p>
+            <a:pPr marL="457200" lvl="1" indent="0">
+              <a:buNone/>
+            </a:pPr>
+            <a:endParaRPr lang="en-US" dirty="0"/>
+          </a:p>
+        </p:txBody>
+      </p:sp>
+    </p:spTree>
+    <p:extLst>
+      <p:ext uri="{BB962C8B-B14F-4D97-AF65-F5344CB8AC3E}">
+        <p14:creationId xmlns:p14="http://schemas.microsoft.com/office/powerpoint/2010/main" val="2454877801"/>
+      </p:ext>
+    </p:extLst>
+  </p:cSld>
+  <p:clrMapOvr>
+    <a:masterClrMapping/>
+  </p:clrMapOvr>
+</p:sld>
+</file>
+
+<file path=ppt/slides/slide4.xml><?xml version="1.0" encoding="utf-8"?>
+<p:sld xmlns:a="http://schemas.openxmlformats.org/drawingml/2006/main" xmlns:r="http://schemas.openxmlformats.org/officeDocument/2006/relationships" xmlns:p="http://schemas.openxmlformats.org/presentationml/2006/main">
+  <p:cSld>
+    <p:spTree>
+      <p:nvGrpSpPr>
+        <p:cNvPr id="1" name=""/>
+        <p:cNvGrpSpPr/>
+        <p:nvPr/>
+      </p:nvGrpSpPr>
+      <p:grpSpPr>
+        <a:xfrm>
+          <a:off x="0" y="0"/>
+          <a:ext cx="0" cy="0"/>
+          <a:chOff x="0" y="0"/>
+          <a:chExt cx="0" cy="0"/>
+        </a:xfrm>
+      </p:grpSpPr>
+      <p:sp>
+        <p:nvSpPr>
+          <p:cNvPr id="2" name="Title 1">
+            <a:extLst>
+              <a:ext uri="{FF2B5EF4-FFF2-40B4-BE49-F238E27FC236}">
                 <a16:creationId xmlns:a16="http://schemas.microsoft.com/office/drawing/2014/main" id="{439F498E-FDAC-48DD-9371-80F6D4843F57}"/>
               </a:ext>
             </a:extLst>
@@ -3764,10 +4026,10 @@
       </p:sp>
       <p:pic>
         <p:nvPicPr>
-          <p:cNvPr id="4" name="Picture 3">
-            <a:extLst>
-              <a:ext uri="{FF2B5EF4-FFF2-40B4-BE49-F238E27FC236}">
-                <a16:creationId xmlns:a16="http://schemas.microsoft.com/office/drawing/2014/main" id="{5B443723-780F-4673-91DB-FAD9402AC875}"/>
+          <p:cNvPr id="6" name="Picture 5">
+            <a:extLst>
+              <a:ext uri="{FF2B5EF4-FFF2-40B4-BE49-F238E27FC236}">
+                <a16:creationId xmlns:a16="http://schemas.microsoft.com/office/drawing/2014/main" id="{C750C2FA-F736-4E85-B6FA-9BCB3622BC12}"/>
               </a:ext>
             </a:extLst>
           </p:cNvPr>
@@ -3784,8 +4046,8 @@
         </p:blipFill>
         <p:spPr>
           <a:xfrm>
-            <a:off x="6361832" y="2091140"/>
-            <a:ext cx="5458587" cy="3982006"/>
+            <a:off x="2634060" y="1182187"/>
+            <a:ext cx="7459111" cy="5441376"/>
           </a:xfrm>
           <a:prstGeom prst="rect">
             <a:avLst/>

</xml_diff>